<commit_message>
Update P8 - Computer Vision Part 4 Thresholding (skimage).pptx
</commit_message>
<xml_diff>
--- a/A. Raspberry Pi - Image Processing/#8 - Computer Vision Part 4 Thresholding (skimage)/P8 - Computer Vision Part 4 Thresholding (skimage).pptx
+++ b/A. Raspberry Pi - Image Processing/#8 - Computer Vision Part 4 Thresholding (skimage)/P8 - Computer Vision Part 4 Thresholding (skimage).pptx
@@ -5403,7 +5403,7 @@
                 <a:rPr lang="en-US">
                   <a:sym typeface="+mn-ea"/>
                 </a:rPr>
-                <a:t>binary_Yen = </a:t>
+                <a:t>ret, binary_Yen = </a:t>
               </a:r>
               <a:r>
                 <a:rPr lang="en-US">
@@ -6039,18 +6039,42 @@
                 <a:rPr lang="en-US">
                   <a:sym typeface="+mn-ea"/>
                 </a:rPr>
-                <a:t>	thresh_Yen = flt.threshold_yen(img)</a:t>
-              </a:r>
-              <a:endParaRPr lang="en-US">
-                <a:sym typeface="+mn-ea"/>
-              </a:endParaRPr>
-            </a:p>
-            <a:p>
+                <a:t>	thresh_Yen = flt.threshold_yen(</a:t>
+              </a:r>
               <a:r>
                 <a:rPr lang="en-US">
                   <a:sym typeface="+mn-ea"/>
                 </a:rPr>
-                <a:t>	binary_Yen = cv2.threshold(img, thresh_Yen, 255, cv2.THRESH_BINARY)</a:t>
+                <a:t>gray</a:t>
+              </a:r>
+              <a:r>
+                <a:rPr lang="en-US">
+                  <a:sym typeface="+mn-ea"/>
+                </a:rPr>
+                <a:t>)</a:t>
+              </a:r>
+              <a:endParaRPr lang="en-US">
+                <a:sym typeface="+mn-ea"/>
+              </a:endParaRPr>
+            </a:p>
+            <a:p>
+              <a:r>
+                <a:rPr lang="en-US">
+                  <a:sym typeface="+mn-ea"/>
+                </a:rPr>
+                <a:t>	ret, binary_Yen = cv2.threshold(</a:t>
+              </a:r>
+              <a:r>
+                <a:rPr lang="en-US">
+                  <a:sym typeface="+mn-ea"/>
+                </a:rPr>
+                <a:t>gray</a:t>
+              </a:r>
+              <a:r>
+                <a:rPr lang="en-US">
+                  <a:sym typeface="+mn-ea"/>
+                </a:rPr>
+                <a:t>, thresh_Yen, 255, cv2.THRESH_BINARY)</a:t>
               </a:r>
               <a:endParaRPr lang="en-US">
                 <a:sym typeface="+mn-ea"/>
@@ -8874,7 +8898,15 @@
             </a:r>
             <a:r>
               <a:rPr lang="en-US"/>
-              <a:t>are the mean and standard deviation of </a:t>
+              <a:t>are the </a:t>
+            </a:r>
+            <a:r>
+              <a:rPr lang="en-US" b="1"/>
+              <a:t>mean </a:t>
+            </a:r>
+            <a:r>
+              <a:rPr lang="en-US"/>
+              <a:t>and standard deviation of </a:t>
             </a:r>
             <a:r>
               <a:rPr lang="en-US" b="1"/>
@@ -10710,7 +10742,15 @@
             </a:r>
             <a:r>
               <a:rPr lang="en-US" i="1"/>
-              <a:t>Callable[[float], Any], optional</a:t>
+              <a:t>Callable[[float], Any], </a:t>
+            </a:r>
+            <a:r>
+              <a:rPr lang="en-US" i="1">
+                <a:solidFill>
+                  <a:srgbClr val="FF0000"/>
+                </a:solidFill>
+              </a:rPr>
+              <a:t>optional</a:t>
             </a:r>
             <a:endParaRPr lang="en-US" i="1"/>
           </a:p>
@@ -11596,7 +11636,7 @@
                 <a:rPr lang="en-US">
                   <a:sym typeface="+mn-ea"/>
                 </a:rPr>
-                <a:t>binary_Li = </a:t>
+                <a:t>ret, binary_Li = </a:t>
               </a:r>
               <a:r>
                 <a:rPr lang="en-US">
@@ -12220,7 +12260,7 @@
                 <a:rPr lang="en-US">
                   <a:sym typeface="+mn-ea"/>
                 </a:rPr>
-                <a:t>thresh_Li = flt.threshold_li(img)</a:t>
+                <a:t>thresh_Li = flt.threshold_li(gray)</a:t>
               </a:r>
               <a:endParaRPr lang="en-US">
                 <a:sym typeface="+mn-ea"/>
@@ -12232,7 +12272,19 @@
                 <a:rPr lang="en-US">
                   <a:sym typeface="+mn-ea"/>
                 </a:rPr>
-                <a:t>binary_Li = cv2.threshold(img, thresh_Li, 255, cv2.THRESH_BINARY)</a:t>
+                <a:t>ret, binary_Li = cv2.threshold(</a:t>
+              </a:r>
+              <a:r>
+                <a:rPr lang="en-US">
+                  <a:sym typeface="+mn-ea"/>
+                </a:rPr>
+                <a:t>gray</a:t>
+              </a:r>
+              <a:r>
+                <a:rPr lang="en-US">
+                  <a:sym typeface="+mn-ea"/>
+                </a:rPr>
+                <a:t>, thresh_Li, 255, cv2.THRESH_BINARY)</a:t>
               </a:r>
               <a:endParaRPr lang="en-US">
                 <a:sym typeface="+mn-ea"/>

</xml_diff>